<commit_message>
updated report with demo section
</commit_message>
<xml_diff>
--- a/report/report.pptx
+++ b/report/report.pptx
@@ -7,7 +7,7 @@
     <p:sldMasterId id="2147483665" r:id="rId3"/>
   </p:sldMasterIdLst>
   <p:notesMasterIdLst>
-    <p:notesMasterId r:id="rId20"/>
+    <p:notesMasterId r:id="rId23"/>
   </p:notesMasterIdLst>
   <p:sldIdLst>
     <p:sldId id="257" r:id="rId4"/>
@@ -25,7 +25,10 @@
     <p:sldId id="272" r:id="rId16"/>
     <p:sldId id="264" r:id="rId17"/>
     <p:sldId id="274" r:id="rId18"/>
-    <p:sldId id="260" r:id="rId19"/>
+    <p:sldId id="275" r:id="rId19"/>
+    <p:sldId id="276" r:id="rId20"/>
+    <p:sldId id="277" r:id="rId21"/>
+    <p:sldId id="260" r:id="rId22"/>
   </p:sldIdLst>
   <p:sldSz cx="12192000" cy="6858000"/>
   <p:notesSz cx="6858000" cy="9144000"/>
@@ -214,7 +217,7 @@
           <a:p>
             <a:fld id="{B531991D-0E2A-4560-95BD-771ECA52C37F}" type="datetimeFigureOut">
               <a:rPr lang="en-US" smtClean="0"/>
-              <a:t>9/24/2021</a:t>
+              <a:t>10/11/2021</a:t>
             </a:fld>
             <a:endParaRPr lang="en-US"/>
           </a:p>
@@ -596,7 +599,7 @@
           <a:p>
             <a:fld id="{AA302EFC-ED59-4B4D-993E-400BC651A785}" type="datetime1">
               <a:rPr lang="en-US" smtClean="0"/>
-              <a:t>9/24/2021</a:t>
+              <a:t>10/11/2021</a:t>
             </a:fld>
             <a:endParaRPr lang="en-US" dirty="0"/>
           </a:p>
@@ -917,7 +920,7 @@
           <a:p>
             <a:fld id="{169D4A64-F671-4E30-BCF6-95D54EEAC02A}" type="datetime1">
               <a:rPr lang="en-US" smtClean="0"/>
-              <a:t>9/24/2021</a:t>
+              <a:t>10/11/2021</a:t>
             </a:fld>
             <a:endParaRPr lang="en-US" dirty="0"/>
           </a:p>
@@ -1109,7 +1112,7 @@
           <a:p>
             <a:fld id="{7B3F78A3-FD76-4F63-AF81-1396C1841E9C}" type="datetime1">
               <a:rPr lang="en-US" smtClean="0"/>
-              <a:t>9/24/2021</a:t>
+              <a:t>10/11/2021</a:t>
             </a:fld>
             <a:endParaRPr lang="en-US" dirty="0"/>
           </a:p>
@@ -1301,7 +1304,7 @@
           <a:p>
             <a:fld id="{1067E7C5-37BF-4B94-8AB4-87E727052233}" type="datetime1">
               <a:rPr lang="en-US" smtClean="0"/>
-              <a:t>9/24/2021</a:t>
+              <a:t>10/11/2021</a:t>
             </a:fld>
             <a:endParaRPr lang="en-US" dirty="0"/>
           </a:p>
@@ -1572,7 +1575,7 @@
           <a:p>
             <a:fld id="{30B9AB43-16D5-496C-92E2-DD88A4837C90}" type="datetime1">
               <a:rPr lang="en-US" smtClean="0"/>
-              <a:t>9/24/2021</a:t>
+              <a:t>10/11/2021</a:t>
             </a:fld>
             <a:endParaRPr lang="en-US" dirty="0"/>
           </a:p>
@@ -2267,7 +2270,7 @@
           <a:p>
             <a:fld id="{E5E1D892-C2A9-4E2A-B7C0-5932B657ED52}" type="datetime1">
               <a:rPr lang="en-US" smtClean="0"/>
-              <a:t>9/24/2021</a:t>
+              <a:t>10/11/2021</a:t>
             </a:fld>
             <a:endParaRPr lang="en-US" dirty="0"/>
           </a:p>
@@ -2961,7 +2964,7 @@
           <a:p>
             <a:fld id="{2983D189-BC30-430F-BBBC-47FE85CCFEB3}" type="datetime1">
               <a:rPr lang="en-US" smtClean="0"/>
-              <a:t>9/24/2021</a:t>
+              <a:t>10/11/2021</a:t>
             </a:fld>
             <a:endParaRPr lang="en-US" dirty="0"/>
           </a:p>
@@ -7767,6 +7770,1244 @@
           </a:bodyPr>
           <a:lstStyle/>
           <a:p>
+            <a:pPr algn="r"/>
+            <a:r>
+              <a:rPr lang="en-US" sz="6000" dirty="0">
+                <a:solidFill>
+                  <a:schemeClr val="tx1">
+                    <a:lumMod val="85000"/>
+                    <a:lumOff val="15000"/>
+                  </a:schemeClr>
+                </a:solidFill>
+              </a:rPr>
+              <a:t>DEMO</a:t>
+            </a:r>
+          </a:p>
+        </p:txBody>
+      </p:sp>
+      <p:cxnSp>
+        <p:nvCxnSpPr>
+          <p:cNvPr id="60" name="Straight Connector 59">
+            <a:extLst>
+              <a:ext uri="{FF2B5EF4-FFF2-40B4-BE49-F238E27FC236}">
+                <a16:creationId xmlns:a16="http://schemas.microsoft.com/office/drawing/2014/main" id="{09525C9A-1972-4836-BA7A-706C946EF4DA}"/>
+              </a:ext>
+              <a:ext uri="{C183D7F6-B498-43B3-948B-1728B52AA6E4}">
+                <adec:decorative xmlns:adec="http://schemas.microsoft.com/office/drawing/2017/decorative" val="1"/>
+              </a:ext>
+            </a:extLst>
+          </p:cNvPr>
+          <p:cNvCxnSpPr>
+            <a:cxnSpLocks noGrp="1" noRot="1" noChangeAspect="1" noMove="1" noResize="1" noEditPoints="1" noAdjustHandles="1" noChangeArrowheads="1" noChangeShapeType="1"/>
+          </p:cNvCxnSpPr>
+          <p:nvPr>
+            <p:extLst>
+              <p:ext uri="{386F3935-93C4-4BCD-93E2-E3B085C9AB24}">
+                <p16:designElem xmlns:p16="http://schemas.microsoft.com/office/powerpoint/2015/main" val="1"/>
+              </p:ext>
+            </p:extLst>
+          </p:nvPr>
+        </p:nvCxnSpPr>
+        <p:spPr>
+          <a:xfrm>
+            <a:off x="7534656" y="1520631"/>
+            <a:ext cx="0" cy="3558208"/>
+          </a:xfrm>
+          <a:prstGeom prst="line">
+            <a:avLst/>
+          </a:prstGeom>
+          <a:ln>
+            <a:solidFill>
+              <a:schemeClr val="tx1">
+                <a:lumMod val="75000"/>
+                <a:lumOff val="25000"/>
+              </a:schemeClr>
+            </a:solidFill>
+          </a:ln>
+        </p:spPr>
+        <p:style>
+          <a:lnRef idx="1">
+            <a:schemeClr val="accent1"/>
+          </a:lnRef>
+          <a:fillRef idx="0">
+            <a:schemeClr val="accent1"/>
+          </a:fillRef>
+          <a:effectRef idx="0">
+            <a:schemeClr val="accent1"/>
+          </a:effectRef>
+          <a:fontRef idx="minor">
+            <a:schemeClr val="tx1"/>
+          </a:fontRef>
+        </p:style>
+      </p:cxnSp>
+      <p:sp>
+        <p:nvSpPr>
+          <p:cNvPr id="62" name="Rectangle 61">
+            <a:extLst>
+              <a:ext uri="{FF2B5EF4-FFF2-40B4-BE49-F238E27FC236}">
+                <a16:creationId xmlns:a16="http://schemas.microsoft.com/office/drawing/2014/main" id="{8D60EC1B-554F-47EF-839A-BAAD858F6666}"/>
+              </a:ext>
+              <a:ext uri="{C183D7F6-B498-43B3-948B-1728B52AA6E4}">
+                <adec:decorative xmlns:adec="http://schemas.microsoft.com/office/drawing/2017/decorative" val="1"/>
+              </a:ext>
+            </a:extLst>
+          </p:cNvPr>
+          <p:cNvSpPr>
+            <a:spLocks noGrp="1" noRot="1" noChangeAspect="1" noMove="1" noResize="1" noEditPoints="1" noAdjustHandles="1" noChangeArrowheads="1" noChangeShapeType="1" noTextEdit="1"/>
+          </p:cNvSpPr>
+          <p:nvPr>
+            <p:extLst>
+              <p:ext uri="{386F3935-93C4-4BCD-93E2-E3B085C9AB24}">
+                <p16:designElem xmlns:p16="http://schemas.microsoft.com/office/powerpoint/2015/main" val="1"/>
+              </p:ext>
+            </p:extLst>
+          </p:nvPr>
+        </p:nvSpPr>
+        <p:spPr>
+          <a:xfrm>
+            <a:off x="0" y="6400800"/>
+            <a:ext cx="12192000" cy="457200"/>
+          </a:xfrm>
+          <a:prstGeom prst="rect">
+            <a:avLst/>
+          </a:prstGeom>
+          <a:solidFill>
+            <a:srgbClr val="262626"/>
+          </a:solidFill>
+          <a:ln>
+            <a:noFill/>
+          </a:ln>
+        </p:spPr>
+        <p:style>
+          <a:lnRef idx="2">
+            <a:schemeClr val="accent1">
+              <a:shade val="50000"/>
+            </a:schemeClr>
+          </a:lnRef>
+          <a:fillRef idx="1">
+            <a:schemeClr val="accent1"/>
+          </a:fillRef>
+          <a:effectRef idx="0">
+            <a:schemeClr val="accent1"/>
+          </a:effectRef>
+          <a:fontRef idx="minor">
+            <a:schemeClr val="lt1"/>
+          </a:fontRef>
+        </p:style>
+      </p:sp>
+      <p:sp>
+        <p:nvSpPr>
+          <p:cNvPr id="3" name="Slide Number Placeholder 2">
+            <a:extLst>
+              <a:ext uri="{FF2B5EF4-FFF2-40B4-BE49-F238E27FC236}">
+                <a16:creationId xmlns:a16="http://schemas.microsoft.com/office/drawing/2014/main" id="{B920D061-64E6-43D0-ACA0-362DEADE9230}"/>
+              </a:ext>
+            </a:extLst>
+          </p:cNvPr>
+          <p:cNvSpPr>
+            <a:spLocks noGrp="1"/>
+          </p:cNvSpPr>
+          <p:nvPr>
+            <p:ph type="sldNum" sz="quarter" idx="12"/>
+          </p:nvPr>
+        </p:nvSpPr>
+        <p:spPr/>
+        <p:txBody>
+          <a:bodyPr/>
+          <a:lstStyle/>
+          <a:p>
+            <a:fld id="{3A98EE3D-8CD1-4C3F-BD1C-C98C9596463C}" type="slidenum">
+              <a:rPr lang="en-US" smtClean="0"/>
+              <a:t>16</a:t>
+            </a:fld>
+            <a:endParaRPr lang="en-US" dirty="0"/>
+          </a:p>
+        </p:txBody>
+      </p:sp>
+      <p:sp>
+        <p:nvSpPr>
+          <p:cNvPr id="4" name="Footer Placeholder 3">
+            <a:extLst>
+              <a:ext uri="{FF2B5EF4-FFF2-40B4-BE49-F238E27FC236}">
+                <a16:creationId xmlns:a16="http://schemas.microsoft.com/office/drawing/2014/main" id="{CEC076FD-DF3F-45DC-ADFA-C7EE13A1E263}"/>
+              </a:ext>
+            </a:extLst>
+          </p:cNvPr>
+          <p:cNvSpPr>
+            <a:spLocks noGrp="1"/>
+          </p:cNvSpPr>
+          <p:nvPr>
+            <p:ph type="ftr" sz="quarter" idx="11"/>
+          </p:nvPr>
+        </p:nvSpPr>
+        <p:spPr/>
+        <p:txBody>
+          <a:bodyPr/>
+          <a:lstStyle/>
+          <a:p>
+            <a:r>
+              <a:rPr lang="en-US"/>
+              <a:t>Lampros Lountzis</a:t>
+            </a:r>
+            <a:endParaRPr lang="en-US" dirty="0"/>
+          </a:p>
+        </p:txBody>
+      </p:sp>
+    </p:spTree>
+    <p:extLst>
+      <p:ext uri="{BB962C8B-B14F-4D97-AF65-F5344CB8AC3E}">
+        <p14:creationId xmlns:p14="http://schemas.microsoft.com/office/powerpoint/2010/main" val="820953951"/>
+      </p:ext>
+    </p:extLst>
+  </p:cSld>
+  <p:clrMapOvr>
+    <a:masterClrMapping/>
+  </p:clrMapOvr>
+</p:sld>
+</file>
+
+<file path=ppt/slides/slide17.xml><?xml version="1.0" encoding="utf-8"?>
+<p:sld xmlns:a="http://schemas.openxmlformats.org/drawingml/2006/main" xmlns:r="http://schemas.openxmlformats.org/officeDocument/2006/relationships" xmlns:p="http://schemas.openxmlformats.org/presentationml/2006/main">
+  <p:cSld>
+    <p:bg>
+      <p:bgPr>
+        <a:solidFill>
+          <a:schemeClr val="bg1"/>
+        </a:solidFill>
+        <a:effectLst/>
+      </p:bgPr>
+    </p:bg>
+    <p:spTree>
+      <p:nvGrpSpPr>
+        <p:cNvPr id="1" name=""/>
+        <p:cNvGrpSpPr/>
+        <p:nvPr/>
+      </p:nvGrpSpPr>
+      <p:grpSpPr>
+        <a:xfrm>
+          <a:off x="0" y="0"/>
+          <a:ext cx="0" cy="0"/>
+          <a:chOff x="0" y="0"/>
+          <a:chExt cx="0" cy="0"/>
+        </a:xfrm>
+      </p:grpSpPr>
+      <p:sp>
+        <p:nvSpPr>
+          <p:cNvPr id="30" name="Rectangle 29">
+            <a:extLst>
+              <a:ext uri="{FF2B5EF4-FFF2-40B4-BE49-F238E27FC236}">
+                <a16:creationId xmlns:a16="http://schemas.microsoft.com/office/drawing/2014/main" id="{A8E9C91B-7EAD-4562-AB0E-DFB9663AECE3}"/>
+              </a:ext>
+              <a:ext uri="{C183D7F6-B498-43B3-948B-1728B52AA6E4}">
+                <adec:decorative xmlns:adec="http://schemas.microsoft.com/office/drawing/2017/decorative" val="1"/>
+              </a:ext>
+            </a:extLst>
+          </p:cNvPr>
+          <p:cNvSpPr>
+            <a:spLocks noGrp="1" noRot="1" noChangeAspect="1" noMove="1" noResize="1" noEditPoints="1" noAdjustHandles="1" noChangeArrowheads="1" noChangeShapeType="1" noTextEdit="1"/>
+          </p:cNvSpPr>
+          <p:nvPr>
+            <p:extLst>
+              <p:ext uri="{386F3935-93C4-4BCD-93E2-E3B085C9AB24}">
+                <p16:designElem xmlns:p16="http://schemas.microsoft.com/office/powerpoint/2015/main" val="1"/>
+              </p:ext>
+            </p:extLst>
+          </p:nvPr>
+        </p:nvSpPr>
+        <p:spPr>
+          <a:xfrm>
+            <a:off x="3175" y="6400800"/>
+            <a:ext cx="12188825" cy="457200"/>
+          </a:xfrm>
+          <a:prstGeom prst="rect">
+            <a:avLst/>
+          </a:prstGeom>
+          <a:solidFill>
+            <a:srgbClr val="262626"/>
+          </a:solidFill>
+          <a:ln>
+            <a:noFill/>
+          </a:ln>
+        </p:spPr>
+        <p:style>
+          <a:lnRef idx="2">
+            <a:schemeClr val="accent1">
+              <a:shade val="50000"/>
+            </a:schemeClr>
+          </a:lnRef>
+          <a:fillRef idx="1">
+            <a:schemeClr val="accent1"/>
+          </a:fillRef>
+          <a:effectRef idx="0">
+            <a:schemeClr val="accent1"/>
+          </a:effectRef>
+          <a:fontRef idx="minor">
+            <a:schemeClr val="lt1"/>
+          </a:fontRef>
+        </p:style>
+      </p:sp>
+      <p:sp>
+        <p:nvSpPr>
+          <p:cNvPr id="32" name="Rectangle 31">
+            <a:extLst>
+              <a:ext uri="{FF2B5EF4-FFF2-40B4-BE49-F238E27FC236}">
+                <a16:creationId xmlns:a16="http://schemas.microsoft.com/office/drawing/2014/main" id="{41497DE5-0939-4D1D-9350-0C5E1B209C68}"/>
+              </a:ext>
+              <a:ext uri="{C183D7F6-B498-43B3-948B-1728B52AA6E4}">
+                <adec:decorative xmlns:adec="http://schemas.microsoft.com/office/drawing/2017/decorative" val="1"/>
+              </a:ext>
+            </a:extLst>
+          </p:cNvPr>
+          <p:cNvSpPr>
+            <a:spLocks noGrp="1" noRot="1" noChangeAspect="1" noMove="1" noResize="1" noEditPoints="1" noAdjustHandles="1" noChangeArrowheads="1" noChangeShapeType="1" noTextEdit="1"/>
+          </p:cNvSpPr>
+          <p:nvPr>
+            <p:extLst>
+              <p:ext uri="{386F3935-93C4-4BCD-93E2-E3B085C9AB24}">
+                <p16:designElem xmlns:p16="http://schemas.microsoft.com/office/powerpoint/2015/main" val="1"/>
+              </p:ext>
+            </p:extLst>
+          </p:nvPr>
+        </p:nvSpPr>
+        <p:spPr>
+          <a:xfrm>
+            <a:off x="0" y="0"/>
+            <a:ext cx="12192000" cy="6858000"/>
+          </a:xfrm>
+          <a:prstGeom prst="rect">
+            <a:avLst/>
+          </a:prstGeom>
+          <a:solidFill>
+            <a:srgbClr val="262626"/>
+          </a:solidFill>
+          <a:ln>
+            <a:noFill/>
+          </a:ln>
+        </p:spPr>
+        <p:style>
+          <a:lnRef idx="2">
+            <a:schemeClr val="accent1">
+              <a:shade val="50000"/>
+            </a:schemeClr>
+          </a:lnRef>
+          <a:fillRef idx="1">
+            <a:schemeClr val="accent1"/>
+          </a:fillRef>
+          <a:effectRef idx="0">
+            <a:schemeClr val="accent1"/>
+          </a:effectRef>
+          <a:fontRef idx="minor">
+            <a:schemeClr val="lt1"/>
+          </a:fontRef>
+        </p:style>
+        <p:txBody>
+          <a:bodyPr rtlCol="0" anchor="ctr"/>
+          <a:lstStyle/>
+          <a:p>
+            <a:pPr algn="ctr"/>
+            <a:endParaRPr lang="en-US"/>
+          </a:p>
+        </p:txBody>
+      </p:sp>
+      <p:sp>
+        <p:nvSpPr>
+          <p:cNvPr id="34" name="Rectangle 33">
+            <a:extLst>
+              <a:ext uri="{FF2B5EF4-FFF2-40B4-BE49-F238E27FC236}">
+                <a16:creationId xmlns:a16="http://schemas.microsoft.com/office/drawing/2014/main" id="{5CCC70ED-6C63-4537-B7EB-51990D6C0A6F}"/>
+              </a:ext>
+              <a:ext uri="{C183D7F6-B498-43B3-948B-1728B52AA6E4}">
+                <adec:decorative xmlns:adec="http://schemas.microsoft.com/office/drawing/2017/decorative" val="1"/>
+              </a:ext>
+            </a:extLst>
+          </p:cNvPr>
+          <p:cNvSpPr>
+            <a:spLocks noGrp="1" noRot="1" noChangeAspect="1" noMove="1" noResize="1" noEditPoints="1" noAdjustHandles="1" noChangeArrowheads="1" noChangeShapeType="1" noTextEdit="1"/>
+          </p:cNvSpPr>
+          <p:nvPr>
+            <p:extLst>
+              <p:ext uri="{386F3935-93C4-4BCD-93E2-E3B085C9AB24}">
+                <p16:designElem xmlns:p16="http://schemas.microsoft.com/office/powerpoint/2015/main" val="1"/>
+              </p:ext>
+            </p:extLst>
+          </p:nvPr>
+        </p:nvSpPr>
+        <p:spPr>
+          <a:xfrm>
+            <a:off x="458724" y="457200"/>
+            <a:ext cx="11274552" cy="5943600"/>
+          </a:xfrm>
+          <a:prstGeom prst="rect">
+            <a:avLst/>
+          </a:prstGeom>
+          <a:ln>
+            <a:noFill/>
+          </a:ln>
+        </p:spPr>
+        <p:style>
+          <a:lnRef idx="2">
+            <a:schemeClr val="accent1">
+              <a:shade val="50000"/>
+            </a:schemeClr>
+          </a:lnRef>
+          <a:fillRef idx="1">
+            <a:schemeClr val="accent1"/>
+          </a:fillRef>
+          <a:effectRef idx="0">
+            <a:schemeClr val="accent1"/>
+          </a:effectRef>
+          <a:fontRef idx="minor">
+            <a:schemeClr val="lt1"/>
+          </a:fontRef>
+        </p:style>
+        <p:txBody>
+          <a:bodyPr rtlCol="0" anchor="ctr"/>
+          <a:lstStyle/>
+          <a:p>
+            <a:pPr algn="ctr"/>
+            <a:endParaRPr lang="en-US"/>
+          </a:p>
+        </p:txBody>
+      </p:sp>
+      <p:sp>
+        <p:nvSpPr>
+          <p:cNvPr id="36" name="Rectangle 35">
+            <a:extLst>
+              <a:ext uri="{FF2B5EF4-FFF2-40B4-BE49-F238E27FC236}">
+                <a16:creationId xmlns:a16="http://schemas.microsoft.com/office/drawing/2014/main" id="{B76E24C1-2968-40DC-A36E-F6B85F0F0752}"/>
+              </a:ext>
+              <a:ext uri="{C183D7F6-B498-43B3-948B-1728B52AA6E4}">
+                <adec:decorative xmlns:adec="http://schemas.microsoft.com/office/drawing/2017/decorative" val="1"/>
+              </a:ext>
+            </a:extLst>
+          </p:cNvPr>
+          <p:cNvSpPr>
+            <a:spLocks noGrp="1" noRot="1" noChangeAspect="1" noMove="1" noResize="1" noEditPoints="1" noAdjustHandles="1" noChangeArrowheads="1" noChangeShapeType="1" noTextEdit="1"/>
+          </p:cNvSpPr>
+          <p:nvPr>
+            <p:extLst>
+              <p:ext uri="{386F3935-93C4-4BCD-93E2-E3B085C9AB24}">
+                <p16:designElem xmlns:p16="http://schemas.microsoft.com/office/powerpoint/2015/main" val="1"/>
+              </p:ext>
+            </p:extLst>
+          </p:nvPr>
+        </p:nvSpPr>
+        <p:spPr>
+          <a:xfrm>
+            <a:off x="522732" y="521208"/>
+            <a:ext cx="11146536" cy="5815584"/>
+          </a:xfrm>
+          <a:prstGeom prst="rect">
+            <a:avLst/>
+          </a:prstGeom>
+          <a:solidFill>
+            <a:srgbClr val="FFFFFF"/>
+          </a:solidFill>
+          <a:ln>
+            <a:noFill/>
+          </a:ln>
+        </p:spPr>
+        <p:style>
+          <a:lnRef idx="2">
+            <a:schemeClr val="accent1">
+              <a:shade val="50000"/>
+            </a:schemeClr>
+          </a:lnRef>
+          <a:fillRef idx="1">
+            <a:schemeClr val="accent1"/>
+          </a:fillRef>
+          <a:effectRef idx="0">
+            <a:schemeClr val="accent1"/>
+          </a:effectRef>
+          <a:fontRef idx="minor">
+            <a:schemeClr val="lt1"/>
+          </a:fontRef>
+        </p:style>
+        <p:txBody>
+          <a:bodyPr rtlCol="0" anchor="ctr"/>
+          <a:lstStyle/>
+          <a:p>
+            <a:pPr algn="ctr"/>
+            <a:endParaRPr lang="en-US"/>
+          </a:p>
+        </p:txBody>
+      </p:sp>
+      <p:pic>
+        <p:nvPicPr>
+          <p:cNvPr id="11" name="Content Placeholder 10" descr="A screenshot of a computer&#10;&#10;Description automatically generated with medium confidence">
+            <a:extLst>
+              <a:ext uri="{FF2B5EF4-FFF2-40B4-BE49-F238E27FC236}">
+                <a16:creationId xmlns:a16="http://schemas.microsoft.com/office/drawing/2014/main" id="{8E7DAE05-D522-4BA4-831B-F160497CC712}"/>
+              </a:ext>
+            </a:extLst>
+          </p:cNvPr>
+          <p:cNvPicPr>
+            <a:picLocks noGrp="1" noChangeAspect="1"/>
+          </p:cNvPicPr>
+          <p:nvPr>
+            <p:ph idx="1"/>
+          </p:nvPr>
+        </p:nvPicPr>
+        <p:blipFill rotWithShape="1">
+          <a:blip r:embed="rId2">
+            <a:extLst>
+              <a:ext uri="{28A0092B-C50C-407E-A947-70E740481C1C}">
+                <a14:useLocalDpi xmlns:a14="http://schemas.microsoft.com/office/drawing/2010/main" val="0"/>
+              </a:ext>
+            </a:extLst>
+          </a:blip>
+          <a:srcRect l="9602" r="6398" b="1"/>
+          <a:stretch/>
+        </p:blipFill>
+        <p:spPr>
+          <a:xfrm>
+            <a:off x="458725" y="434022"/>
+            <a:ext cx="11274552" cy="5968281"/>
+          </a:xfrm>
+          <a:prstGeom prst="rect">
+            <a:avLst/>
+          </a:prstGeom>
+        </p:spPr>
+      </p:pic>
+      <p:sp>
+        <p:nvSpPr>
+          <p:cNvPr id="4" name="Footer Placeholder 3">
+            <a:extLst>
+              <a:ext uri="{FF2B5EF4-FFF2-40B4-BE49-F238E27FC236}">
+                <a16:creationId xmlns:a16="http://schemas.microsoft.com/office/drawing/2014/main" id="{52F68A55-D323-48BD-A00A-E14A5B4B0B02}"/>
+              </a:ext>
+            </a:extLst>
+          </p:cNvPr>
+          <p:cNvSpPr>
+            <a:spLocks noGrp="1"/>
+          </p:cNvSpPr>
+          <p:nvPr>
+            <p:ph type="ftr" sz="quarter" idx="11"/>
+          </p:nvPr>
+        </p:nvSpPr>
+        <p:spPr>
+          <a:xfrm>
+            <a:off x="1097279" y="6446838"/>
+            <a:ext cx="6818262" cy="365125"/>
+          </a:xfrm>
+        </p:spPr>
+        <p:txBody>
+          <a:bodyPr vert="horz" lIns="91440" tIns="45720" rIns="91440" bIns="45720" rtlCol="0" anchor="ctr">
+            <a:normAutofit/>
+          </a:bodyPr>
+          <a:lstStyle/>
+          <a:p>
+            <a:pPr>
+              <a:spcAft>
+                <a:spcPts val="600"/>
+              </a:spcAft>
+            </a:pPr>
+            <a:r>
+              <a:rPr lang="en-US" kern="1200" cap="all" baseline="0">
+                <a:solidFill>
+                  <a:srgbClr val="FFFFFF"/>
+                </a:solidFill>
+                <a:latin typeface="+mn-lt"/>
+                <a:ea typeface="+mn-ea"/>
+                <a:cs typeface="+mn-cs"/>
+              </a:rPr>
+              <a:t>Lampros Lountzis</a:t>
+            </a:r>
+          </a:p>
+        </p:txBody>
+      </p:sp>
+      <p:sp>
+        <p:nvSpPr>
+          <p:cNvPr id="5" name="Slide Number Placeholder 4">
+            <a:extLst>
+              <a:ext uri="{FF2B5EF4-FFF2-40B4-BE49-F238E27FC236}">
+                <a16:creationId xmlns:a16="http://schemas.microsoft.com/office/drawing/2014/main" id="{4301D32C-98D4-4085-A9AF-AF0B5DAFC439}"/>
+              </a:ext>
+            </a:extLst>
+          </p:cNvPr>
+          <p:cNvSpPr>
+            <a:spLocks noGrp="1"/>
+          </p:cNvSpPr>
+          <p:nvPr>
+            <p:ph type="sldNum" sz="quarter" idx="12"/>
+          </p:nvPr>
+        </p:nvSpPr>
+        <p:spPr>
+          <a:xfrm>
+            <a:off x="10993582" y="6446838"/>
+            <a:ext cx="780010" cy="365125"/>
+          </a:xfrm>
+        </p:spPr>
+        <p:txBody>
+          <a:bodyPr vert="horz" lIns="91440" tIns="45720" rIns="91440" bIns="45720" rtlCol="0" anchor="ctr">
+            <a:normAutofit/>
+          </a:bodyPr>
+          <a:lstStyle/>
+          <a:p>
+            <a:pPr>
+              <a:spcAft>
+                <a:spcPts val="600"/>
+              </a:spcAft>
+            </a:pPr>
+            <a:fld id="{3A98EE3D-8CD1-4C3F-BD1C-C98C9596463C}" type="slidenum">
+              <a:rPr lang="en-US" sz="1050"/>
+              <a:pPr>
+                <a:spcAft>
+                  <a:spcPts val="600"/>
+                </a:spcAft>
+              </a:pPr>
+              <a:t>17</a:t>
+            </a:fld>
+            <a:endParaRPr lang="en-US" sz="1050"/>
+          </a:p>
+        </p:txBody>
+      </p:sp>
+    </p:spTree>
+    <p:extLst>
+      <p:ext uri="{BB962C8B-B14F-4D97-AF65-F5344CB8AC3E}">
+        <p14:creationId xmlns:p14="http://schemas.microsoft.com/office/powerpoint/2010/main" val="3399706800"/>
+      </p:ext>
+    </p:extLst>
+  </p:cSld>
+  <p:clrMapOvr>
+    <a:masterClrMapping/>
+  </p:clrMapOvr>
+</p:sld>
+</file>
+
+<file path=ppt/slides/slide18.xml><?xml version="1.0" encoding="utf-8"?>
+<p:sld xmlns:a="http://schemas.openxmlformats.org/drawingml/2006/main" xmlns:r="http://schemas.openxmlformats.org/officeDocument/2006/relationships" xmlns:p="http://schemas.openxmlformats.org/presentationml/2006/main">
+  <p:cSld>
+    <p:bg>
+      <p:bgPr>
+        <a:solidFill>
+          <a:schemeClr val="bg1"/>
+        </a:solidFill>
+        <a:effectLst/>
+      </p:bgPr>
+    </p:bg>
+    <p:spTree>
+      <p:nvGrpSpPr>
+        <p:cNvPr id="1" name=""/>
+        <p:cNvGrpSpPr/>
+        <p:nvPr/>
+      </p:nvGrpSpPr>
+      <p:grpSpPr>
+        <a:xfrm>
+          <a:off x="0" y="0"/>
+          <a:ext cx="0" cy="0"/>
+          <a:chOff x="0" y="0"/>
+          <a:chExt cx="0" cy="0"/>
+        </a:xfrm>
+      </p:grpSpPr>
+      <p:sp>
+        <p:nvSpPr>
+          <p:cNvPr id="30" name="Rectangle 29">
+            <a:extLst>
+              <a:ext uri="{FF2B5EF4-FFF2-40B4-BE49-F238E27FC236}">
+                <a16:creationId xmlns:a16="http://schemas.microsoft.com/office/drawing/2014/main" id="{A8E9C91B-7EAD-4562-AB0E-DFB9663AECE3}"/>
+              </a:ext>
+              <a:ext uri="{C183D7F6-B498-43B3-948B-1728B52AA6E4}">
+                <adec:decorative xmlns:adec="http://schemas.microsoft.com/office/drawing/2017/decorative" val="1"/>
+              </a:ext>
+            </a:extLst>
+          </p:cNvPr>
+          <p:cNvSpPr>
+            <a:spLocks noGrp="1" noRot="1" noChangeAspect="1" noMove="1" noResize="1" noEditPoints="1" noAdjustHandles="1" noChangeArrowheads="1" noChangeShapeType="1" noTextEdit="1"/>
+          </p:cNvSpPr>
+          <p:nvPr>
+            <p:extLst>
+              <p:ext uri="{386F3935-93C4-4BCD-93E2-E3B085C9AB24}">
+                <p16:designElem xmlns:p16="http://schemas.microsoft.com/office/powerpoint/2015/main" val="1"/>
+              </p:ext>
+            </p:extLst>
+          </p:nvPr>
+        </p:nvSpPr>
+        <p:spPr>
+          <a:xfrm>
+            <a:off x="3175" y="6400800"/>
+            <a:ext cx="12188825" cy="457200"/>
+          </a:xfrm>
+          <a:prstGeom prst="rect">
+            <a:avLst/>
+          </a:prstGeom>
+          <a:solidFill>
+            <a:srgbClr val="262626"/>
+          </a:solidFill>
+          <a:ln>
+            <a:noFill/>
+          </a:ln>
+        </p:spPr>
+        <p:style>
+          <a:lnRef idx="2">
+            <a:schemeClr val="accent1">
+              <a:shade val="50000"/>
+            </a:schemeClr>
+          </a:lnRef>
+          <a:fillRef idx="1">
+            <a:schemeClr val="accent1"/>
+          </a:fillRef>
+          <a:effectRef idx="0">
+            <a:schemeClr val="accent1"/>
+          </a:effectRef>
+          <a:fontRef idx="minor">
+            <a:schemeClr val="lt1"/>
+          </a:fontRef>
+        </p:style>
+      </p:sp>
+      <p:sp>
+        <p:nvSpPr>
+          <p:cNvPr id="32" name="Rectangle 31">
+            <a:extLst>
+              <a:ext uri="{FF2B5EF4-FFF2-40B4-BE49-F238E27FC236}">
+                <a16:creationId xmlns:a16="http://schemas.microsoft.com/office/drawing/2014/main" id="{41497DE5-0939-4D1D-9350-0C5E1B209C68}"/>
+              </a:ext>
+              <a:ext uri="{C183D7F6-B498-43B3-948B-1728B52AA6E4}">
+                <adec:decorative xmlns:adec="http://schemas.microsoft.com/office/drawing/2017/decorative" val="1"/>
+              </a:ext>
+            </a:extLst>
+          </p:cNvPr>
+          <p:cNvSpPr>
+            <a:spLocks noGrp="1" noRot="1" noChangeAspect="1" noMove="1" noResize="1" noEditPoints="1" noAdjustHandles="1" noChangeArrowheads="1" noChangeShapeType="1" noTextEdit="1"/>
+          </p:cNvSpPr>
+          <p:nvPr>
+            <p:extLst>
+              <p:ext uri="{386F3935-93C4-4BCD-93E2-E3B085C9AB24}">
+                <p16:designElem xmlns:p16="http://schemas.microsoft.com/office/powerpoint/2015/main" val="1"/>
+              </p:ext>
+            </p:extLst>
+          </p:nvPr>
+        </p:nvSpPr>
+        <p:spPr>
+          <a:xfrm>
+            <a:off x="0" y="0"/>
+            <a:ext cx="12192000" cy="6858000"/>
+          </a:xfrm>
+          <a:prstGeom prst="rect">
+            <a:avLst/>
+          </a:prstGeom>
+          <a:solidFill>
+            <a:srgbClr val="262626"/>
+          </a:solidFill>
+          <a:ln>
+            <a:noFill/>
+          </a:ln>
+        </p:spPr>
+        <p:style>
+          <a:lnRef idx="2">
+            <a:schemeClr val="accent1">
+              <a:shade val="50000"/>
+            </a:schemeClr>
+          </a:lnRef>
+          <a:fillRef idx="1">
+            <a:schemeClr val="accent1"/>
+          </a:fillRef>
+          <a:effectRef idx="0">
+            <a:schemeClr val="accent1"/>
+          </a:effectRef>
+          <a:fontRef idx="minor">
+            <a:schemeClr val="lt1"/>
+          </a:fontRef>
+        </p:style>
+        <p:txBody>
+          <a:bodyPr rtlCol="0" anchor="ctr"/>
+          <a:lstStyle/>
+          <a:p>
+            <a:pPr algn="ctr"/>
+            <a:endParaRPr lang="en-US"/>
+          </a:p>
+        </p:txBody>
+      </p:sp>
+      <p:sp>
+        <p:nvSpPr>
+          <p:cNvPr id="34" name="Rectangle 33">
+            <a:extLst>
+              <a:ext uri="{FF2B5EF4-FFF2-40B4-BE49-F238E27FC236}">
+                <a16:creationId xmlns:a16="http://schemas.microsoft.com/office/drawing/2014/main" id="{5CCC70ED-6C63-4537-B7EB-51990D6C0A6F}"/>
+              </a:ext>
+              <a:ext uri="{C183D7F6-B498-43B3-948B-1728B52AA6E4}">
+                <adec:decorative xmlns:adec="http://schemas.microsoft.com/office/drawing/2017/decorative" val="1"/>
+              </a:ext>
+            </a:extLst>
+          </p:cNvPr>
+          <p:cNvSpPr>
+            <a:spLocks noGrp="1" noRot="1" noChangeAspect="1" noMove="1" noResize="1" noEditPoints="1" noAdjustHandles="1" noChangeArrowheads="1" noChangeShapeType="1" noTextEdit="1"/>
+          </p:cNvSpPr>
+          <p:nvPr>
+            <p:extLst>
+              <p:ext uri="{386F3935-93C4-4BCD-93E2-E3B085C9AB24}">
+                <p16:designElem xmlns:p16="http://schemas.microsoft.com/office/powerpoint/2015/main" val="1"/>
+              </p:ext>
+            </p:extLst>
+          </p:nvPr>
+        </p:nvSpPr>
+        <p:spPr>
+          <a:xfrm>
+            <a:off x="458724" y="457200"/>
+            <a:ext cx="11274552" cy="5943600"/>
+          </a:xfrm>
+          <a:prstGeom prst="rect">
+            <a:avLst/>
+          </a:prstGeom>
+          <a:ln>
+            <a:noFill/>
+          </a:ln>
+        </p:spPr>
+        <p:style>
+          <a:lnRef idx="2">
+            <a:schemeClr val="accent1">
+              <a:shade val="50000"/>
+            </a:schemeClr>
+          </a:lnRef>
+          <a:fillRef idx="1">
+            <a:schemeClr val="accent1"/>
+          </a:fillRef>
+          <a:effectRef idx="0">
+            <a:schemeClr val="accent1"/>
+          </a:effectRef>
+          <a:fontRef idx="minor">
+            <a:schemeClr val="lt1"/>
+          </a:fontRef>
+        </p:style>
+        <p:txBody>
+          <a:bodyPr rtlCol="0" anchor="ctr"/>
+          <a:lstStyle/>
+          <a:p>
+            <a:pPr algn="ctr"/>
+            <a:endParaRPr lang="en-US"/>
+          </a:p>
+        </p:txBody>
+      </p:sp>
+      <p:sp>
+        <p:nvSpPr>
+          <p:cNvPr id="36" name="Rectangle 35">
+            <a:extLst>
+              <a:ext uri="{FF2B5EF4-FFF2-40B4-BE49-F238E27FC236}">
+                <a16:creationId xmlns:a16="http://schemas.microsoft.com/office/drawing/2014/main" id="{B76E24C1-2968-40DC-A36E-F6B85F0F0752}"/>
+              </a:ext>
+              <a:ext uri="{C183D7F6-B498-43B3-948B-1728B52AA6E4}">
+                <adec:decorative xmlns:adec="http://schemas.microsoft.com/office/drawing/2017/decorative" val="1"/>
+              </a:ext>
+            </a:extLst>
+          </p:cNvPr>
+          <p:cNvSpPr>
+            <a:spLocks noGrp="1" noRot="1" noChangeAspect="1" noMove="1" noResize="1" noEditPoints="1" noAdjustHandles="1" noChangeArrowheads="1" noChangeShapeType="1" noTextEdit="1"/>
+          </p:cNvSpPr>
+          <p:nvPr>
+            <p:extLst>
+              <p:ext uri="{386F3935-93C4-4BCD-93E2-E3B085C9AB24}">
+                <p16:designElem xmlns:p16="http://schemas.microsoft.com/office/powerpoint/2015/main" val="1"/>
+              </p:ext>
+            </p:extLst>
+          </p:nvPr>
+        </p:nvSpPr>
+        <p:spPr>
+          <a:xfrm>
+            <a:off x="522732" y="521208"/>
+            <a:ext cx="11146536" cy="5815584"/>
+          </a:xfrm>
+          <a:prstGeom prst="rect">
+            <a:avLst/>
+          </a:prstGeom>
+          <a:solidFill>
+            <a:srgbClr val="FFFFFF"/>
+          </a:solidFill>
+          <a:ln>
+            <a:noFill/>
+          </a:ln>
+        </p:spPr>
+        <p:style>
+          <a:lnRef idx="2">
+            <a:schemeClr val="accent1">
+              <a:shade val="50000"/>
+            </a:schemeClr>
+          </a:lnRef>
+          <a:fillRef idx="1">
+            <a:schemeClr val="accent1"/>
+          </a:fillRef>
+          <a:effectRef idx="0">
+            <a:schemeClr val="accent1"/>
+          </a:effectRef>
+          <a:fontRef idx="minor">
+            <a:schemeClr val="lt1"/>
+          </a:fontRef>
+        </p:style>
+        <p:txBody>
+          <a:bodyPr rtlCol="0" anchor="ctr"/>
+          <a:lstStyle/>
+          <a:p>
+            <a:pPr algn="ctr"/>
+            <a:endParaRPr lang="en-US"/>
+          </a:p>
+        </p:txBody>
+      </p:sp>
+      <p:pic>
+        <p:nvPicPr>
+          <p:cNvPr id="9" name="Content Placeholder 8" descr="Graphical user interface, text, application&#10;&#10;Description automatically generated">
+            <a:extLst>
+              <a:ext uri="{FF2B5EF4-FFF2-40B4-BE49-F238E27FC236}">
+                <a16:creationId xmlns:a16="http://schemas.microsoft.com/office/drawing/2014/main" id="{3A793744-9D4F-4723-99B8-997D3FC0667B}"/>
+              </a:ext>
+            </a:extLst>
+          </p:cNvPr>
+          <p:cNvPicPr>
+            <a:picLocks noGrp="1" noChangeAspect="1"/>
+          </p:cNvPicPr>
+          <p:nvPr>
+            <p:ph idx="1"/>
+          </p:nvPr>
+        </p:nvPicPr>
+        <p:blipFill>
+          <a:blip r:embed="rId2">
+            <a:extLst>
+              <a:ext uri="{28A0092B-C50C-407E-A947-70E740481C1C}">
+                <a14:useLocalDpi xmlns:a14="http://schemas.microsoft.com/office/drawing/2010/main" val="0"/>
+              </a:ext>
+            </a:extLst>
+          </a:blip>
+          <a:stretch>
+            <a:fillRect/>
+          </a:stretch>
+        </p:blipFill>
+        <p:spPr>
+          <a:xfrm>
+            <a:off x="456790" y="457200"/>
+            <a:ext cx="11276486" cy="5943600"/>
+          </a:xfrm>
+          <a:prstGeom prst="rect">
+            <a:avLst/>
+          </a:prstGeom>
+        </p:spPr>
+      </p:pic>
+      <p:sp>
+        <p:nvSpPr>
+          <p:cNvPr id="4" name="Footer Placeholder 3">
+            <a:extLst>
+              <a:ext uri="{FF2B5EF4-FFF2-40B4-BE49-F238E27FC236}">
+                <a16:creationId xmlns:a16="http://schemas.microsoft.com/office/drawing/2014/main" id="{52F68A55-D323-48BD-A00A-E14A5B4B0B02}"/>
+              </a:ext>
+            </a:extLst>
+          </p:cNvPr>
+          <p:cNvSpPr>
+            <a:spLocks noGrp="1"/>
+          </p:cNvSpPr>
+          <p:nvPr>
+            <p:ph type="ftr" sz="quarter" idx="11"/>
+          </p:nvPr>
+        </p:nvSpPr>
+        <p:spPr>
+          <a:xfrm>
+            <a:off x="1097279" y="6446838"/>
+            <a:ext cx="6818262" cy="365125"/>
+          </a:xfrm>
+        </p:spPr>
+        <p:txBody>
+          <a:bodyPr vert="horz" lIns="91440" tIns="45720" rIns="91440" bIns="45720" rtlCol="0" anchor="ctr">
+            <a:normAutofit/>
+          </a:bodyPr>
+          <a:lstStyle/>
+          <a:p>
+            <a:pPr>
+              <a:spcAft>
+                <a:spcPts val="600"/>
+              </a:spcAft>
+            </a:pPr>
+            <a:r>
+              <a:rPr lang="en-US" kern="1200" cap="all" baseline="0">
+                <a:solidFill>
+                  <a:srgbClr val="FFFFFF"/>
+                </a:solidFill>
+                <a:latin typeface="+mn-lt"/>
+                <a:ea typeface="+mn-ea"/>
+                <a:cs typeface="+mn-cs"/>
+              </a:rPr>
+              <a:t>Lampros Lountzis</a:t>
+            </a:r>
+          </a:p>
+        </p:txBody>
+      </p:sp>
+      <p:sp>
+        <p:nvSpPr>
+          <p:cNvPr id="5" name="Slide Number Placeholder 4">
+            <a:extLst>
+              <a:ext uri="{FF2B5EF4-FFF2-40B4-BE49-F238E27FC236}">
+                <a16:creationId xmlns:a16="http://schemas.microsoft.com/office/drawing/2014/main" id="{4301D32C-98D4-4085-A9AF-AF0B5DAFC439}"/>
+              </a:ext>
+            </a:extLst>
+          </p:cNvPr>
+          <p:cNvSpPr>
+            <a:spLocks noGrp="1"/>
+          </p:cNvSpPr>
+          <p:nvPr>
+            <p:ph type="sldNum" sz="quarter" idx="12"/>
+          </p:nvPr>
+        </p:nvSpPr>
+        <p:spPr>
+          <a:xfrm>
+            <a:off x="10993582" y="6446838"/>
+            <a:ext cx="780010" cy="365125"/>
+          </a:xfrm>
+        </p:spPr>
+        <p:txBody>
+          <a:bodyPr vert="horz" lIns="91440" tIns="45720" rIns="91440" bIns="45720" rtlCol="0" anchor="ctr">
+            <a:normAutofit/>
+          </a:bodyPr>
+          <a:lstStyle/>
+          <a:p>
+            <a:pPr>
+              <a:spcAft>
+                <a:spcPts val="600"/>
+              </a:spcAft>
+            </a:pPr>
+            <a:fld id="{3A98EE3D-8CD1-4C3F-BD1C-C98C9596463C}" type="slidenum">
+              <a:rPr lang="en-US" sz="1050"/>
+              <a:pPr>
+                <a:spcAft>
+                  <a:spcPts val="600"/>
+                </a:spcAft>
+              </a:pPr>
+              <a:t>18</a:t>
+            </a:fld>
+            <a:endParaRPr lang="en-US" sz="1050"/>
+          </a:p>
+        </p:txBody>
+      </p:sp>
+    </p:spTree>
+    <p:extLst>
+      <p:ext uri="{BB962C8B-B14F-4D97-AF65-F5344CB8AC3E}">
+        <p14:creationId xmlns:p14="http://schemas.microsoft.com/office/powerpoint/2010/main" val="2589166318"/>
+      </p:ext>
+    </p:extLst>
+  </p:cSld>
+  <p:clrMapOvr>
+    <a:masterClrMapping/>
+  </p:clrMapOvr>
+</p:sld>
+</file>
+
+<file path=ppt/slides/slide19.xml><?xml version="1.0" encoding="utf-8"?>
+<p:sld xmlns:a="http://schemas.openxmlformats.org/drawingml/2006/main" xmlns:r="http://schemas.openxmlformats.org/officeDocument/2006/relationships" xmlns:p="http://schemas.openxmlformats.org/presentationml/2006/main">
+  <p:cSld>
+    <p:bg>
+      <p:bgPr>
+        <a:solidFill>
+          <a:schemeClr val="bg1"/>
+        </a:solidFill>
+        <a:effectLst/>
+      </p:bgPr>
+    </p:bg>
+    <p:spTree>
+      <p:nvGrpSpPr>
+        <p:cNvPr id="1" name=""/>
+        <p:cNvGrpSpPr/>
+        <p:nvPr/>
+      </p:nvGrpSpPr>
+      <p:grpSpPr>
+        <a:xfrm>
+          <a:off x="0" y="0"/>
+          <a:ext cx="0" cy="0"/>
+          <a:chOff x="0" y="0"/>
+          <a:chExt cx="0" cy="0"/>
+        </a:xfrm>
+      </p:grpSpPr>
+      <p:sp>
+        <p:nvSpPr>
+          <p:cNvPr id="54" name="Rectangle 53">
+            <a:extLst>
+              <a:ext uri="{FF2B5EF4-FFF2-40B4-BE49-F238E27FC236}">
+                <a16:creationId xmlns:a16="http://schemas.microsoft.com/office/drawing/2014/main" id="{39E3965E-AC41-4711-9D10-E25ABB132D86}"/>
+              </a:ext>
+              <a:ext uri="{C183D7F6-B498-43B3-948B-1728B52AA6E4}">
+                <adec:decorative xmlns:adec="http://schemas.microsoft.com/office/drawing/2017/decorative" val="1"/>
+              </a:ext>
+            </a:extLst>
+          </p:cNvPr>
+          <p:cNvSpPr>
+            <a:spLocks noGrp="1" noRot="1" noChangeAspect="1" noMove="1" noResize="1" noEditPoints="1" noAdjustHandles="1" noChangeArrowheads="1" noChangeShapeType="1" noTextEdit="1"/>
+          </p:cNvSpPr>
+          <p:nvPr>
+            <p:extLst>
+              <p:ext uri="{386F3935-93C4-4BCD-93E2-E3B085C9AB24}">
+                <p16:designElem xmlns:p16="http://schemas.microsoft.com/office/powerpoint/2015/main" val="1"/>
+              </p:ext>
+            </p:extLst>
+          </p:nvPr>
+        </p:nvSpPr>
+        <p:spPr>
+          <a:xfrm>
+            <a:off x="3175" y="6400800"/>
+            <a:ext cx="12188825" cy="457200"/>
+          </a:xfrm>
+          <a:prstGeom prst="rect">
+            <a:avLst/>
+          </a:prstGeom>
+          <a:solidFill>
+            <a:srgbClr val="262626"/>
+          </a:solidFill>
+          <a:ln>
+            <a:noFill/>
+          </a:ln>
+        </p:spPr>
+        <p:style>
+          <a:lnRef idx="2">
+            <a:schemeClr val="accent1">
+              <a:shade val="50000"/>
+            </a:schemeClr>
+          </a:lnRef>
+          <a:fillRef idx="1">
+            <a:schemeClr val="accent1"/>
+          </a:fillRef>
+          <a:effectRef idx="0">
+            <a:schemeClr val="accent1"/>
+          </a:effectRef>
+          <a:fontRef idx="minor">
+            <a:schemeClr val="lt1"/>
+          </a:fontRef>
+        </p:style>
+      </p:sp>
+      <p:cxnSp>
+        <p:nvCxnSpPr>
+          <p:cNvPr id="56" name="Straight Connector 55">
+            <a:extLst>
+              <a:ext uri="{FF2B5EF4-FFF2-40B4-BE49-F238E27FC236}">
+                <a16:creationId xmlns:a16="http://schemas.microsoft.com/office/drawing/2014/main" id="{1F5DC8C3-BA5F-4EED-BB9A-A14272BD82A1}"/>
+              </a:ext>
+              <a:ext uri="{C183D7F6-B498-43B3-948B-1728B52AA6E4}">
+                <adec:decorative xmlns:adec="http://schemas.microsoft.com/office/drawing/2017/decorative" val="1"/>
+              </a:ext>
+            </a:extLst>
+          </p:cNvPr>
+          <p:cNvCxnSpPr>
+            <a:cxnSpLocks noGrp="1" noRot="1" noChangeAspect="1" noMove="1" noResize="1" noEditPoints="1" noAdjustHandles="1" noChangeArrowheads="1" noChangeShapeType="1"/>
+          </p:cNvCxnSpPr>
+          <p:nvPr>
+            <p:extLst>
+              <p:ext uri="{386F3935-93C4-4BCD-93E2-E3B085C9AB24}">
+                <p16:designElem xmlns:p16="http://schemas.microsoft.com/office/powerpoint/2015/main" val="1"/>
+              </p:ext>
+            </p:extLst>
+          </p:nvPr>
+        </p:nvCxnSpPr>
+        <p:spPr>
+          <a:xfrm>
+            <a:off x="1207658" y="4474741"/>
+            <a:ext cx="9875520" cy="0"/>
+          </a:xfrm>
+          <a:prstGeom prst="line">
+            <a:avLst/>
+          </a:prstGeom>
+          <a:ln w="12700">
+            <a:solidFill>
+              <a:schemeClr val="tx1">
+                <a:lumMod val="75000"/>
+                <a:lumOff val="25000"/>
+              </a:schemeClr>
+            </a:solidFill>
+          </a:ln>
+        </p:spPr>
+        <p:style>
+          <a:lnRef idx="1">
+            <a:schemeClr val="accent1"/>
+          </a:lnRef>
+          <a:fillRef idx="0">
+            <a:schemeClr val="accent1"/>
+          </a:fillRef>
+          <a:effectRef idx="0">
+            <a:schemeClr val="accent1"/>
+          </a:effectRef>
+          <a:fontRef idx="minor">
+            <a:schemeClr val="tx1"/>
+          </a:fontRef>
+        </p:style>
+      </p:cxnSp>
+      <p:sp useBgFill="1">
+        <p:nvSpPr>
+          <p:cNvPr id="58" name="Rectangle 57">
+            <a:extLst>
+              <a:ext uri="{FF2B5EF4-FFF2-40B4-BE49-F238E27FC236}">
+                <a16:creationId xmlns:a16="http://schemas.microsoft.com/office/drawing/2014/main" id="{8C6E698C-8155-4B8B-BDC9-B7299772B509}"/>
+              </a:ext>
+              <a:ext uri="{C183D7F6-B498-43B3-948B-1728B52AA6E4}">
+                <adec:decorative xmlns:adec="http://schemas.microsoft.com/office/drawing/2017/decorative" val="1"/>
+              </a:ext>
+            </a:extLst>
+          </p:cNvPr>
+          <p:cNvSpPr>
+            <a:spLocks noGrp="1" noRot="1" noChangeAspect="1" noMove="1" noResize="1" noEditPoints="1" noAdjustHandles="1" noChangeArrowheads="1" noChangeShapeType="1" noTextEdit="1"/>
+          </p:cNvSpPr>
+          <p:nvPr>
+            <p:extLst>
+              <p:ext uri="{386F3935-93C4-4BCD-93E2-E3B085C9AB24}">
+                <p16:designElem xmlns:p16="http://schemas.microsoft.com/office/powerpoint/2015/main" val="1"/>
+              </p:ext>
+            </p:extLst>
+          </p:nvPr>
+        </p:nvSpPr>
+        <p:spPr>
+          <a:xfrm>
+            <a:off x="0" y="0"/>
+            <a:ext cx="12188952" cy="6858000"/>
+          </a:xfrm>
+          <a:prstGeom prst="rect">
+            <a:avLst/>
+          </a:prstGeom>
+          <a:ln>
+            <a:noFill/>
+          </a:ln>
+        </p:spPr>
+        <p:style>
+          <a:lnRef idx="2">
+            <a:schemeClr val="accent1">
+              <a:shade val="50000"/>
+            </a:schemeClr>
+          </a:lnRef>
+          <a:fillRef idx="1">
+            <a:schemeClr val="accent1"/>
+          </a:fillRef>
+          <a:effectRef idx="0">
+            <a:schemeClr val="accent1"/>
+          </a:effectRef>
+          <a:fontRef idx="minor">
+            <a:schemeClr val="lt1"/>
+          </a:fontRef>
+        </p:style>
+        <p:txBody>
+          <a:bodyPr rtlCol="0" anchor="ctr"/>
+          <a:lstStyle/>
+          <a:p>
+            <a:pPr algn="ctr"/>
+            <a:endParaRPr lang="en-US"/>
+          </a:p>
+        </p:txBody>
+      </p:sp>
+      <p:sp>
+        <p:nvSpPr>
+          <p:cNvPr id="2" name="Title 1">
+            <a:extLst>
+              <a:ext uri="{FF2B5EF4-FFF2-40B4-BE49-F238E27FC236}">
+                <a16:creationId xmlns:a16="http://schemas.microsoft.com/office/drawing/2014/main" id="{66A47F5C-50EC-416A-AE8C-6F6BB4225673}"/>
+              </a:ext>
+            </a:extLst>
+          </p:cNvPr>
+          <p:cNvSpPr>
+            <a:spLocks noGrp="1"/>
+          </p:cNvSpPr>
+          <p:nvPr>
+            <p:ph type="title"/>
+          </p:nvPr>
+        </p:nvSpPr>
+        <p:spPr>
+          <a:xfrm>
+            <a:off x="965201" y="772731"/>
+            <a:ext cx="6255026" cy="5054008"/>
+          </a:xfrm>
+        </p:spPr>
+        <p:txBody>
+          <a:bodyPr vert="horz" lIns="91440" tIns="45720" rIns="91440" bIns="45720" rtlCol="0" anchor="ctr">
+            <a:normAutofit/>
+          </a:bodyPr>
+          <a:lstStyle/>
+          <a:p>
             <a:pPr marL="201168" lvl="1" indent="0" algn="ctr">
               <a:buNone/>
             </a:pPr>
@@ -8290,6 +9531,20 @@
                 </a:solidFill>
               </a:rPr>
               <a:t>Discussion</a:t>
+            </a:r>
+          </a:p>
+          <a:p>
+            <a:pPr marL="544068" lvl="1" indent="-342900">
+              <a:buFont typeface="+mj-lt"/>
+              <a:buAutoNum type="arabicPeriod"/>
+            </a:pPr>
+            <a:r>
+              <a:rPr lang="en-US" sz="1600" b="1" dirty="0">
+                <a:solidFill>
+                  <a:schemeClr val="tx1"/>
+                </a:solidFill>
+              </a:rPr>
+              <a:t>DEMO</a:t>
             </a:r>
           </a:p>
         </p:txBody>
@@ -14249,6 +15504,49 @@
 </a:themeOverride>
 </file>
 
+<file path=ppt/theme/themeOverride17.xml><?xml version="1.0" encoding="utf-8"?>
+<a:themeOverride xmlns:a="http://schemas.openxmlformats.org/drawingml/2006/main">
+  <a:clrScheme name="Custom 40">
+    <a:dk1>
+      <a:sysClr val="windowText" lastClr="000000"/>
+    </a:dk1>
+    <a:lt1>
+      <a:sysClr val="window" lastClr="FFFFFF"/>
+    </a:lt1>
+    <a:dk2>
+      <a:srgbClr val="545D57"/>
+    </a:dk2>
+    <a:lt2>
+      <a:srgbClr val="EBEBE8"/>
+    </a:lt2>
+    <a:accent1>
+      <a:srgbClr val="579858"/>
+    </a:accent1>
+    <a:accent2>
+      <a:srgbClr val="ED583E"/>
+    </a:accent2>
+    <a:accent3>
+      <a:srgbClr val="D3BA59"/>
+    </a:accent3>
+    <a:accent4>
+      <a:srgbClr val="4C94AC"/>
+    </a:accent4>
+    <a:accent5>
+      <a:srgbClr val="A09E84"/>
+    </a:accent5>
+    <a:accent6>
+      <a:srgbClr val="FC7D4A"/>
+    </a:accent6>
+    <a:hlink>
+      <a:srgbClr val="04A2DA"/>
+    </a:hlink>
+    <a:folHlink>
+      <a:srgbClr val="808080"/>
+    </a:folHlink>
+  </a:clrScheme>
+</a:themeOverride>
+</file>
+
 <file path=ppt/theme/themeOverride2.xml><?xml version="1.0" encoding="utf-8"?>
 <a:themeOverride xmlns:a="http://schemas.openxmlformats.org/drawingml/2006/main">
   <a:clrScheme name="Custom 40">

</xml_diff>